<commit_message>
ppt com minha parte atualizada
</commit_message>
<xml_diff>
--- a/CRPO.pptx
+++ b/CRPO.pptx
@@ -208,7 +208,7 @@
           <a:p>
             <a:fld id="{3397FD11-4E9F-44C1-A834-3767C312FD22}" type="datetimeFigureOut">
               <a:rPr lang="pt-BR" smtClean="0"/>
-              <a:t>26/11/2016</a:t>
+              <a:t>02/12/2016</a:t>
             </a:fld>
             <a:endParaRPr lang="pt-BR"/>
           </a:p>
@@ -272,38 +272,37 @@
           <a:p>
             <a:pPr lvl="0"/>
             <a:r>
-              <a:rPr lang="pt-BR" smtClean="0"/>
+              <a:rPr lang="pt-BR"/>
               <a:t>Clique para editar o texto mestre</a:t>
             </a:r>
           </a:p>
           <a:p>
             <a:pPr lvl="1"/>
             <a:r>
-              <a:rPr lang="pt-BR" smtClean="0"/>
+              <a:rPr lang="pt-BR"/>
               <a:t>Segundo nível</a:t>
             </a:r>
           </a:p>
           <a:p>
             <a:pPr lvl="2"/>
             <a:r>
-              <a:rPr lang="pt-BR" smtClean="0"/>
+              <a:rPr lang="pt-BR"/>
               <a:t>Terceiro nível</a:t>
             </a:r>
           </a:p>
           <a:p>
             <a:pPr lvl="3"/>
             <a:r>
-              <a:rPr lang="pt-BR" smtClean="0"/>
+              <a:rPr lang="pt-BR"/>
               <a:t>Quarto nível</a:t>
             </a:r>
           </a:p>
           <a:p>
             <a:pPr lvl="4"/>
             <a:r>
-              <a:rPr lang="pt-BR" smtClean="0"/>
+              <a:rPr lang="pt-BR"/>
               <a:t>Quinto nível</a:t>
             </a:r>
-            <a:endParaRPr lang="pt-BR"/>
           </a:p>
         </p:txBody>
       </p:sp>
@@ -538,36 +537,34 @@
               <a:defRPr/>
             </a:pPr>
             <a:r>
-              <a:rPr lang="it-IT" dirty="0" smtClean="0"/>
+              <a:rPr lang="it-IT" dirty="0"/>
               <a:t>Demetrius</a:t>
             </a:r>
-            <a:endParaRPr lang="pt-BR" dirty="0" smtClean="0"/>
-          </a:p>
-          <a:p>
-            <a:r>
-              <a:rPr lang="it-IT" dirty="0" smtClean="0"/>
+            <a:endParaRPr lang="pt-BR" dirty="0"/>
+          </a:p>
+          <a:p>
+            <a:r>
+              <a:rPr lang="it-IT" dirty="0"/>
               <a:t>Diogo</a:t>
             </a:r>
-            <a:endParaRPr lang="it-IT" dirty="0" smtClean="0"/>
-          </a:p>
-          <a:p>
-            <a:r>
-              <a:rPr lang="it-IT" dirty="0" smtClean="0"/>
+          </a:p>
+          <a:p>
+            <a:r>
+              <a:rPr lang="it-IT" dirty="0"/>
               <a:t>Carlos</a:t>
             </a:r>
           </a:p>
           <a:p>
             <a:r>
-              <a:rPr lang="it-IT" dirty="0" smtClean="0"/>
+              <a:rPr lang="it-IT" dirty="0"/>
               <a:t>Clei</a:t>
             </a:r>
           </a:p>
           <a:p>
             <a:r>
-              <a:rPr lang="it-IT" dirty="0" smtClean="0"/>
+              <a:rPr lang="it-IT" dirty="0"/>
               <a:t>Daniel</a:t>
             </a:r>
-            <a:endParaRPr lang="it-IT" dirty="0" smtClean="0"/>
           </a:p>
         </p:txBody>
       </p:sp>
@@ -652,7 +649,7 @@
           <a:lstStyle/>
           <a:p>
             <a:r>
-              <a:rPr lang="pt-BR" dirty="0" err="1" smtClean="0"/>
+              <a:rPr lang="pt-BR" dirty="0" err="1"/>
               <a:t>clei</a:t>
             </a:r>
             <a:endParaRPr lang="pt-BR" dirty="0"/>
@@ -740,34 +737,34 @@
           <a:lstStyle/>
           <a:p>
             <a:r>
-              <a:rPr lang="it-IT" dirty="0" smtClean="0"/>
+              <a:rPr lang="it-IT" dirty="0"/>
               <a:t>Diogo</a:t>
             </a:r>
           </a:p>
           <a:p>
             <a:r>
-              <a:rPr lang="it-IT" dirty="0" smtClean="0"/>
+              <a:rPr lang="it-IT" dirty="0"/>
               <a:t>Carlos</a:t>
             </a:r>
           </a:p>
           <a:p>
             <a:r>
-              <a:rPr lang="it-IT" dirty="0" smtClean="0"/>
+              <a:rPr lang="it-IT" dirty="0"/>
               <a:t>Clei</a:t>
             </a:r>
           </a:p>
           <a:p>
             <a:r>
-              <a:rPr lang="it-IT" dirty="0" smtClean="0"/>
+              <a:rPr lang="it-IT" dirty="0"/>
               <a:t>Daniel</a:t>
             </a:r>
           </a:p>
           <a:p>
             <a:r>
-              <a:rPr lang="it-IT" dirty="0" smtClean="0"/>
+              <a:rPr lang="it-IT" dirty="0"/>
               <a:t>demetrius</a:t>
             </a:r>
-            <a:endParaRPr lang="pt-BR" dirty="0" smtClean="0"/>
+            <a:endParaRPr lang="pt-BR" dirty="0"/>
           </a:p>
           <a:p>
             <a:endParaRPr lang="pt-BR" dirty="0"/>
@@ -855,10 +852,9 @@
           <a:lstStyle/>
           <a:p>
             <a:r>
-              <a:rPr lang="pt-BR" dirty="0" smtClean="0"/>
+              <a:rPr lang="pt-BR" dirty="0"/>
               <a:t>Diogo – 1:30</a:t>
             </a:r>
-            <a:endParaRPr lang="pt-BR" dirty="0"/>
           </a:p>
         </p:txBody>
       </p:sp>
@@ -943,14 +939,13 @@
           <a:lstStyle/>
           <a:p>
             <a:r>
-              <a:rPr lang="pt-BR" dirty="0" err="1" smtClean="0"/>
+              <a:rPr lang="pt-BR" dirty="0" err="1"/>
               <a:t>carlos</a:t>
             </a:r>
             <a:r>
-              <a:rPr lang="pt-BR" dirty="0" smtClean="0"/>
+              <a:rPr lang="pt-BR" dirty="0"/>
               <a:t> - 2:00 slide 3</a:t>
             </a:r>
-            <a:endParaRPr lang="pt-BR" dirty="0"/>
           </a:p>
         </p:txBody>
       </p:sp>
@@ -1035,14 +1030,13 @@
           <a:lstStyle/>
           <a:p>
             <a:r>
-              <a:rPr lang="pt-BR" dirty="0" err="1" smtClean="0"/>
+              <a:rPr lang="pt-BR" dirty="0" err="1"/>
               <a:t>clei</a:t>
             </a:r>
             <a:r>
-              <a:rPr lang="pt-BR" dirty="0" smtClean="0"/>
+              <a:rPr lang="pt-BR" dirty="0"/>
               <a:t> - 2:00 slide 4</a:t>
             </a:r>
-            <a:endParaRPr lang="pt-BR" dirty="0"/>
           </a:p>
         </p:txBody>
       </p:sp>
@@ -1127,14 +1121,13 @@
           <a:lstStyle/>
           <a:p>
             <a:r>
-              <a:rPr lang="pt-BR" dirty="0" err="1" smtClean="0"/>
+              <a:rPr lang="pt-BR" dirty="0" err="1"/>
               <a:t>daniel</a:t>
             </a:r>
             <a:r>
-              <a:rPr lang="pt-BR" dirty="0" smtClean="0"/>
+              <a:rPr lang="pt-BR" dirty="0"/>
               <a:t> - 2:00 slide 5</a:t>
             </a:r>
-            <a:endParaRPr lang="pt-BR" dirty="0"/>
           </a:p>
         </p:txBody>
       </p:sp>
@@ -1219,14 +1212,13 @@
           <a:lstStyle/>
           <a:p>
             <a:r>
-              <a:rPr lang="pt-BR" dirty="0" err="1" smtClean="0"/>
+              <a:rPr lang="pt-BR" dirty="0" err="1"/>
               <a:t>demetrius</a:t>
             </a:r>
             <a:r>
-              <a:rPr lang="pt-BR" dirty="0" smtClean="0"/>
+              <a:rPr lang="pt-BR" dirty="0"/>
               <a:t> 1:00 slide 6</a:t>
             </a:r>
-            <a:endParaRPr lang="pt-BR" dirty="0"/>
           </a:p>
         </p:txBody>
       </p:sp>
@@ -1311,18 +1303,13 @@
           <a:lstStyle/>
           <a:p>
             <a:r>
-              <a:rPr lang="pt-BR" dirty="0" err="1" smtClean="0"/>
+              <a:rPr lang="pt-BR" dirty="0" err="1"/>
               <a:t>diogo</a:t>
             </a:r>
             <a:r>
-              <a:rPr lang="pt-BR" dirty="0" smtClean="0"/>
-              <a:t> </a:t>
-            </a:r>
-            <a:r>
-              <a:rPr lang="pt-BR" dirty="0" smtClean="0"/>
-              <a:t>1:00 slide 7</a:t>
-            </a:r>
-            <a:endParaRPr lang="pt-BR" dirty="0"/>
+              <a:rPr lang="pt-BR" dirty="0"/>
+              <a:t> 1:00 slide 7</a:t>
+            </a:r>
           </a:p>
         </p:txBody>
       </p:sp>
@@ -1407,28 +1394,20 @@
           <a:lstStyle/>
           <a:p>
             <a:r>
-              <a:rPr lang="pt-BR" dirty="0" err="1" smtClean="0"/>
+              <a:rPr lang="pt-BR" dirty="0" err="1"/>
               <a:t>carlos</a:t>
             </a:r>
             <a:r>
-              <a:rPr lang="pt-BR" dirty="0" smtClean="0"/>
-              <a:t> </a:t>
-            </a:r>
-            <a:r>
-              <a:rPr lang="pt-BR" dirty="0" smtClean="0"/>
-              <a:t>- 1:30 slide </a:t>
-            </a:r>
-            <a:r>
-              <a:rPr lang="pt-BR" dirty="0" smtClean="0"/>
-              <a:t>8</a:t>
-            </a:r>
-          </a:p>
-          <a:p>
-            <a:endParaRPr lang="pt-BR" dirty="0" smtClean="0"/>
-          </a:p>
-          <a:p>
-            <a:r>
-              <a:rPr lang="pt-BR" dirty="0" smtClean="0"/>
+              <a:rPr lang="pt-BR" dirty="0"/>
+              <a:t> - 1:30 slide 8</a:t>
+            </a:r>
+          </a:p>
+          <a:p>
+            <a:endParaRPr lang="pt-BR" dirty="0"/>
+          </a:p>
+          <a:p>
+            <a:r>
+              <a:rPr lang="pt-BR" dirty="0"/>
               <a:t>Colocar estatísticas de comparativo antes e depois</a:t>
             </a:r>
           </a:p>
@@ -1518,34 +1497,34 @@
           <a:lstStyle/>
           <a:p>
             <a:r>
-              <a:rPr lang="it-IT" dirty="0" smtClean="0"/>
+              <a:rPr lang="it-IT" dirty="0"/>
               <a:t>Diogo</a:t>
             </a:r>
           </a:p>
           <a:p>
             <a:r>
-              <a:rPr lang="it-IT" dirty="0" smtClean="0"/>
+              <a:rPr lang="it-IT" dirty="0"/>
               <a:t>Carlos</a:t>
             </a:r>
           </a:p>
           <a:p>
             <a:r>
-              <a:rPr lang="it-IT" dirty="0" smtClean="0"/>
+              <a:rPr lang="it-IT" dirty="0"/>
               <a:t>Clei</a:t>
             </a:r>
           </a:p>
           <a:p>
             <a:r>
-              <a:rPr lang="it-IT" dirty="0" smtClean="0"/>
+              <a:rPr lang="it-IT" dirty="0"/>
               <a:t>Daniel</a:t>
             </a:r>
           </a:p>
           <a:p>
             <a:r>
-              <a:rPr lang="it-IT" dirty="0" smtClean="0"/>
+              <a:rPr lang="it-IT" dirty="0"/>
               <a:t>demetrius</a:t>
             </a:r>
-            <a:endParaRPr lang="pt-BR" dirty="0" smtClean="0"/>
+            <a:endParaRPr lang="pt-BR" dirty="0"/>
           </a:p>
         </p:txBody>
       </p:sp>
@@ -2186,7 +2165,7 @@
           </a:lstStyle>
           <a:p>
             <a:r>
-              <a:rPr lang="pt-BR" smtClean="0"/>
+              <a:rPr lang="pt-BR"/>
               <a:t>Clique para editar o título mestre</a:t>
             </a:r>
             <a:endParaRPr lang="en-US" dirty="0"/>
@@ -2306,7 +2285,7 @@
           </a:lstStyle>
           <a:p>
             <a:r>
-              <a:rPr lang="pt-BR" smtClean="0"/>
+              <a:rPr lang="pt-BR"/>
               <a:t>Clique para editar o estilo do subtítulo mestre</a:t>
             </a:r>
             <a:endParaRPr lang="en-US" dirty="0"/>
@@ -2331,7 +2310,7 @@
             <a:fld id="{B61BEF0D-F0BB-DE4B-95CE-6DB70DBA9567}" type="datetimeFigureOut">
               <a:rPr lang="en-US" dirty="0"/>
               <a:pPr/>
-              <a:t>11/26/2016</a:t>
+              <a:t>12/2/2016</a:t>
             </a:fld>
             <a:endParaRPr lang="en-US" dirty="0"/>
           </a:p>
@@ -2432,7 +2411,7 @@
           </a:lstStyle>
           <a:p>
             <a:r>
-              <a:rPr lang="pt-BR" smtClean="0"/>
+              <a:rPr lang="pt-BR"/>
               <a:t>Clique para editar o título mestre</a:t>
             </a:r>
             <a:endParaRPr lang="en-US" dirty="0"/>
@@ -2555,7 +2534,7 @@
           <a:p>
             <a:pPr lvl="0"/>
             <a:r>
-              <a:rPr lang="pt-BR" smtClean="0"/>
+              <a:rPr lang="pt-BR"/>
               <a:t>Clique para editar o texto mestre</a:t>
             </a:r>
           </a:p>
@@ -2579,7 +2558,7 @@
             <a:fld id="{B61BEF0D-F0BB-DE4B-95CE-6DB70DBA9567}" type="datetimeFigureOut">
               <a:rPr lang="en-US" dirty="0"/>
               <a:pPr/>
-              <a:t>11/26/2016</a:t>
+              <a:t>12/2/2016</a:t>
             </a:fld>
             <a:endParaRPr lang="en-US" dirty="0"/>
           </a:p>
@@ -2680,7 +2659,7 @@
           </a:lstStyle>
           <a:p>
             <a:r>
-              <a:rPr lang="pt-BR" smtClean="0"/>
+              <a:rPr lang="pt-BR"/>
               <a:t>Clique para editar o título mestre</a:t>
             </a:r>
             <a:endParaRPr lang="en-US" dirty="0"/>
@@ -2744,7 +2723,7 @@
           <a:p>
             <a:pPr lvl="0"/>
             <a:r>
-              <a:rPr lang="pt-BR" smtClean="0"/>
+              <a:rPr lang="pt-BR"/>
               <a:t>Clique para editar o texto mestre</a:t>
             </a:r>
           </a:p>
@@ -2866,7 +2845,7 @@
           <a:p>
             <a:pPr lvl="0"/>
             <a:r>
-              <a:rPr lang="pt-BR" smtClean="0"/>
+              <a:rPr lang="pt-BR"/>
               <a:t>Clique para editar o texto mestre</a:t>
             </a:r>
           </a:p>
@@ -2890,7 +2869,7 @@
             <a:fld id="{B61BEF0D-F0BB-DE4B-95CE-6DB70DBA9567}" type="datetimeFigureOut">
               <a:rPr lang="en-US" dirty="0"/>
               <a:pPr/>
-              <a:t>11/26/2016</a:t>
+              <a:t>12/2/2016</a:t>
             </a:fld>
             <a:endParaRPr lang="en-US" dirty="0"/>
           </a:p>
@@ -3073,7 +3052,7 @@
           </a:lstStyle>
           <a:p>
             <a:r>
-              <a:rPr lang="pt-BR" smtClean="0"/>
+              <a:rPr lang="pt-BR"/>
               <a:t>Clique para editar o título mestre</a:t>
             </a:r>
             <a:endParaRPr lang="en-US" dirty="0"/>
@@ -3196,7 +3175,7 @@
           <a:p>
             <a:pPr lvl="0"/>
             <a:r>
-              <a:rPr lang="pt-BR" smtClean="0"/>
+              <a:rPr lang="pt-BR"/>
               <a:t>Clique para editar o texto mestre</a:t>
             </a:r>
           </a:p>
@@ -3220,7 +3199,7 @@
             <a:fld id="{B61BEF0D-F0BB-DE4B-95CE-6DB70DBA9567}" type="datetimeFigureOut">
               <a:rPr lang="en-US" dirty="0"/>
               <a:pPr/>
-              <a:t>11/26/2016</a:t>
+              <a:t>12/2/2016</a:t>
             </a:fld>
             <a:endParaRPr lang="en-US" dirty="0"/>
           </a:p>
@@ -3321,7 +3300,7 @@
           </a:lstStyle>
           <a:p>
             <a:r>
-              <a:rPr lang="pt-BR" smtClean="0"/>
+              <a:rPr lang="pt-BR"/>
               <a:t>Clique para editar o título mestre</a:t>
             </a:r>
             <a:endParaRPr lang="en-US" dirty="0"/>
@@ -3385,7 +3364,7 @@
           <a:p>
             <a:pPr lvl="0"/>
             <a:r>
-              <a:rPr lang="pt-BR" smtClean="0"/>
+              <a:rPr lang="pt-BR"/>
               <a:t>Clique para editar o texto mestre</a:t>
             </a:r>
           </a:p>
@@ -3507,7 +3486,7 @@
           <a:p>
             <a:pPr lvl="0"/>
             <a:r>
-              <a:rPr lang="pt-BR" smtClean="0"/>
+              <a:rPr lang="pt-BR"/>
               <a:t>Clique para editar o texto mestre</a:t>
             </a:r>
           </a:p>
@@ -3531,7 +3510,7 @@
             <a:fld id="{B61BEF0D-F0BB-DE4B-95CE-6DB70DBA9567}" type="datetimeFigureOut">
               <a:rPr lang="en-US" dirty="0"/>
               <a:pPr/>
-              <a:t>11/26/2016</a:t>
+              <a:t>12/2/2016</a:t>
             </a:fld>
             <a:endParaRPr lang="en-US" dirty="0"/>
           </a:p>
@@ -3714,7 +3693,7 @@
           </a:lstStyle>
           <a:p>
             <a:r>
-              <a:rPr lang="pt-BR" smtClean="0"/>
+              <a:rPr lang="pt-BR"/>
               <a:t>Clique para editar o título mestre</a:t>
             </a:r>
             <a:endParaRPr lang="en-US" dirty="0"/>
@@ -3775,7 +3754,7 @@
           <a:p>
             <a:pPr lvl="0"/>
             <a:r>
-              <a:rPr lang="pt-BR" smtClean="0"/>
+              <a:rPr lang="pt-BR"/>
               <a:t>Clique para editar o texto mestre</a:t>
             </a:r>
           </a:p>
@@ -3897,7 +3876,7 @@
           <a:p>
             <a:pPr lvl="0"/>
             <a:r>
-              <a:rPr lang="pt-BR" smtClean="0"/>
+              <a:rPr lang="pt-BR"/>
               <a:t>Clique para editar o texto mestre</a:t>
             </a:r>
           </a:p>
@@ -3921,7 +3900,7 @@
             <a:fld id="{B61BEF0D-F0BB-DE4B-95CE-6DB70DBA9567}" type="datetimeFigureOut">
               <a:rPr lang="en-US" dirty="0"/>
               <a:pPr/>
-              <a:t>11/26/2016</a:t>
+              <a:t>12/2/2016</a:t>
             </a:fld>
             <a:endParaRPr lang="en-US" dirty="0"/>
           </a:p>
@@ -4011,7 +3990,7 @@
           <a:lstStyle/>
           <a:p>
             <a:r>
-              <a:rPr lang="pt-BR" smtClean="0"/>
+              <a:rPr lang="pt-BR"/>
               <a:t>Clique para editar o título mestre</a:t>
             </a:r>
             <a:endParaRPr lang="en-US" dirty="0"/>
@@ -4035,35 +4014,35 @@
           <a:p>
             <a:pPr lvl="0"/>
             <a:r>
-              <a:rPr lang="pt-BR" smtClean="0"/>
+              <a:rPr lang="pt-BR"/>
               <a:t>Clique para editar o texto mestre</a:t>
             </a:r>
           </a:p>
           <a:p>
             <a:pPr lvl="1"/>
             <a:r>
-              <a:rPr lang="pt-BR" smtClean="0"/>
+              <a:rPr lang="pt-BR"/>
               <a:t>Segundo nível</a:t>
             </a:r>
           </a:p>
           <a:p>
             <a:pPr lvl="2"/>
             <a:r>
-              <a:rPr lang="pt-BR" smtClean="0"/>
+              <a:rPr lang="pt-BR"/>
               <a:t>Terceiro nível</a:t>
             </a:r>
           </a:p>
           <a:p>
             <a:pPr lvl="3"/>
             <a:r>
-              <a:rPr lang="pt-BR" smtClean="0"/>
+              <a:rPr lang="pt-BR"/>
               <a:t>Quarto nível</a:t>
             </a:r>
           </a:p>
           <a:p>
             <a:pPr lvl="4"/>
             <a:r>
-              <a:rPr lang="pt-BR" smtClean="0"/>
+              <a:rPr lang="pt-BR"/>
               <a:t>Quinto nível</a:t>
             </a:r>
             <a:endParaRPr lang="en-US" dirty="0"/>
@@ -4087,7 +4066,7 @@
           <a:p>
             <a:fld id="{55C6B4A9-1611-4792-9094-5F34BCA07E0B}" type="datetimeFigureOut">
               <a:rPr lang="en-US" dirty="0"/>
-              <a:t>11/26/2016</a:t>
+              <a:t>12/2/2016</a:t>
             </a:fld>
             <a:endParaRPr lang="en-US" dirty="0"/>
           </a:p>
@@ -4181,7 +4160,7 @@
           <a:lstStyle/>
           <a:p>
             <a:r>
-              <a:rPr lang="pt-BR" smtClean="0"/>
+              <a:rPr lang="pt-BR"/>
               <a:t>Clique para editar o título mestre</a:t>
             </a:r>
             <a:endParaRPr lang="en-US" dirty="0"/>
@@ -4210,35 +4189,35 @@
           <a:p>
             <a:pPr lvl="0"/>
             <a:r>
-              <a:rPr lang="pt-BR" smtClean="0"/>
+              <a:rPr lang="pt-BR"/>
               <a:t>Clique para editar o texto mestre</a:t>
             </a:r>
           </a:p>
           <a:p>
             <a:pPr lvl="1"/>
             <a:r>
-              <a:rPr lang="pt-BR" smtClean="0"/>
+              <a:rPr lang="pt-BR"/>
               <a:t>Segundo nível</a:t>
             </a:r>
           </a:p>
           <a:p>
             <a:pPr lvl="2"/>
             <a:r>
-              <a:rPr lang="pt-BR" smtClean="0"/>
+              <a:rPr lang="pt-BR"/>
               <a:t>Terceiro nível</a:t>
             </a:r>
           </a:p>
           <a:p>
             <a:pPr lvl="3"/>
             <a:r>
-              <a:rPr lang="pt-BR" smtClean="0"/>
+              <a:rPr lang="pt-BR"/>
               <a:t>Quarto nível</a:t>
             </a:r>
           </a:p>
           <a:p>
             <a:pPr lvl="4"/>
             <a:r>
-              <a:rPr lang="pt-BR" smtClean="0"/>
+              <a:rPr lang="pt-BR"/>
               <a:t>Quinto nível</a:t>
             </a:r>
             <a:endParaRPr lang="en-US" dirty="0"/>
@@ -4263,7 +4242,7 @@
             <a:fld id="{B61BEF0D-F0BB-DE4B-95CE-6DB70DBA9567}" type="datetimeFigureOut">
               <a:rPr lang="en-US" dirty="0"/>
               <a:pPr/>
-              <a:t>11/26/2016</a:t>
+              <a:t>12/2/2016</a:t>
             </a:fld>
             <a:endParaRPr lang="en-US" dirty="0"/>
           </a:p>
@@ -4353,7 +4332,7 @@
           <a:lstStyle/>
           <a:p>
             <a:r>
-              <a:rPr lang="pt-BR" smtClean="0"/>
+              <a:rPr lang="pt-BR"/>
               <a:t>Clique para editar o título mestre</a:t>
             </a:r>
             <a:endParaRPr lang="en-US" dirty="0"/>
@@ -4377,35 +4356,35 @@
           <a:p>
             <a:pPr lvl="0"/>
             <a:r>
-              <a:rPr lang="pt-BR" smtClean="0"/>
+              <a:rPr lang="pt-BR"/>
               <a:t>Clique para editar o texto mestre</a:t>
             </a:r>
           </a:p>
           <a:p>
             <a:pPr lvl="1"/>
             <a:r>
-              <a:rPr lang="pt-BR" smtClean="0"/>
+              <a:rPr lang="pt-BR"/>
               <a:t>Segundo nível</a:t>
             </a:r>
           </a:p>
           <a:p>
             <a:pPr lvl="2"/>
             <a:r>
-              <a:rPr lang="pt-BR" smtClean="0"/>
+              <a:rPr lang="pt-BR"/>
               <a:t>Terceiro nível</a:t>
             </a:r>
           </a:p>
           <a:p>
             <a:pPr lvl="3"/>
             <a:r>
-              <a:rPr lang="pt-BR" smtClean="0"/>
+              <a:rPr lang="pt-BR"/>
               <a:t>Quarto nível</a:t>
             </a:r>
           </a:p>
           <a:p>
             <a:pPr lvl="4"/>
             <a:r>
-              <a:rPr lang="pt-BR" smtClean="0"/>
+              <a:rPr lang="pt-BR"/>
               <a:t>Quinto nível</a:t>
             </a:r>
             <a:endParaRPr lang="en-US" dirty="0"/>
@@ -4429,7 +4408,7 @@
           <a:p>
             <a:fld id="{42A54C80-263E-416B-A8E0-580EDEADCBDC}" type="datetimeFigureOut">
               <a:rPr lang="en-US" dirty="0"/>
-              <a:t>11/26/2016</a:t>
+              <a:t>12/2/2016</a:t>
             </a:fld>
             <a:endParaRPr lang="en-US" dirty="0"/>
           </a:p>
@@ -4527,7 +4506,7 @@
           </a:lstStyle>
           <a:p>
             <a:r>
-              <a:rPr lang="pt-BR" smtClean="0"/>
+              <a:rPr lang="pt-BR"/>
               <a:t>Clique para editar o título mestre</a:t>
             </a:r>
             <a:endParaRPr lang="en-US" dirty="0"/>
@@ -4648,7 +4627,7 @@
           <a:p>
             <a:pPr lvl="0"/>
             <a:r>
-              <a:rPr lang="pt-BR" smtClean="0"/>
+              <a:rPr lang="pt-BR"/>
               <a:t>Clique para editar o texto mestre</a:t>
             </a:r>
           </a:p>
@@ -4672,7 +4651,7 @@
             <a:fld id="{B61BEF0D-F0BB-DE4B-95CE-6DB70DBA9567}" type="datetimeFigureOut">
               <a:rPr lang="en-US" dirty="0"/>
               <a:pPr/>
-              <a:t>11/26/2016</a:t>
+              <a:t>12/2/2016</a:t>
             </a:fld>
             <a:endParaRPr lang="en-US" dirty="0"/>
           </a:p>
@@ -4762,7 +4741,7 @@
           <a:lstStyle/>
           <a:p>
             <a:r>
-              <a:rPr lang="pt-BR" smtClean="0"/>
+              <a:rPr lang="pt-BR"/>
               <a:t>Clique para editar o título mestre</a:t>
             </a:r>
             <a:endParaRPr lang="en-US" dirty="0"/>
@@ -4791,35 +4770,35 @@
           <a:p>
             <a:pPr lvl="0"/>
             <a:r>
-              <a:rPr lang="pt-BR" smtClean="0"/>
+              <a:rPr lang="pt-BR"/>
               <a:t>Clique para editar o texto mestre</a:t>
             </a:r>
           </a:p>
           <a:p>
             <a:pPr lvl="1"/>
             <a:r>
-              <a:rPr lang="pt-BR" smtClean="0"/>
+              <a:rPr lang="pt-BR"/>
               <a:t>Segundo nível</a:t>
             </a:r>
           </a:p>
           <a:p>
             <a:pPr lvl="2"/>
             <a:r>
-              <a:rPr lang="pt-BR" smtClean="0"/>
+              <a:rPr lang="pt-BR"/>
               <a:t>Terceiro nível</a:t>
             </a:r>
           </a:p>
           <a:p>
             <a:pPr lvl="3"/>
             <a:r>
-              <a:rPr lang="pt-BR" smtClean="0"/>
+              <a:rPr lang="pt-BR"/>
               <a:t>Quarto nível</a:t>
             </a:r>
           </a:p>
           <a:p>
             <a:pPr lvl="4"/>
             <a:r>
-              <a:rPr lang="pt-BR" smtClean="0"/>
+              <a:rPr lang="pt-BR"/>
               <a:t>Quinto nível</a:t>
             </a:r>
             <a:endParaRPr lang="en-US" dirty="0"/>
@@ -4848,35 +4827,35 @@
           <a:p>
             <a:pPr lvl="0"/>
             <a:r>
-              <a:rPr lang="pt-BR" smtClean="0"/>
+              <a:rPr lang="pt-BR"/>
               <a:t>Clique para editar o texto mestre</a:t>
             </a:r>
           </a:p>
           <a:p>
             <a:pPr lvl="1"/>
             <a:r>
-              <a:rPr lang="pt-BR" smtClean="0"/>
+              <a:rPr lang="pt-BR"/>
               <a:t>Segundo nível</a:t>
             </a:r>
           </a:p>
           <a:p>
             <a:pPr lvl="2"/>
             <a:r>
-              <a:rPr lang="pt-BR" smtClean="0"/>
+              <a:rPr lang="pt-BR"/>
               <a:t>Terceiro nível</a:t>
             </a:r>
           </a:p>
           <a:p>
             <a:pPr lvl="3"/>
             <a:r>
-              <a:rPr lang="pt-BR" smtClean="0"/>
+              <a:rPr lang="pt-BR"/>
               <a:t>Quarto nível</a:t>
             </a:r>
           </a:p>
           <a:p>
             <a:pPr lvl="4"/>
             <a:r>
-              <a:rPr lang="pt-BR" smtClean="0"/>
+              <a:rPr lang="pt-BR"/>
               <a:t>Quinto nível</a:t>
             </a:r>
             <a:endParaRPr lang="en-US" dirty="0"/>
@@ -4900,7 +4879,7 @@
           <a:p>
             <a:fld id="{42A54C80-263E-416B-A8E0-580EDEADCBDC}" type="datetimeFigureOut">
               <a:rPr lang="en-US" dirty="0"/>
-              <a:t>11/26/2016</a:t>
+              <a:t>12/2/2016</a:t>
             </a:fld>
             <a:endParaRPr lang="en-US" dirty="0"/>
           </a:p>
@@ -4993,7 +4972,7 @@
           </a:lstStyle>
           <a:p>
             <a:r>
-              <a:rPr lang="pt-BR" smtClean="0"/>
+              <a:rPr lang="pt-BR"/>
               <a:t>Clique para editar o título mestre</a:t>
             </a:r>
             <a:endParaRPr lang="en-US" dirty="0"/>
@@ -5061,7 +5040,7 @@
           <a:p>
             <a:pPr lvl="0"/>
             <a:r>
-              <a:rPr lang="pt-BR" smtClean="0"/>
+              <a:rPr lang="pt-BR"/>
               <a:t>Clique para editar o texto mestre</a:t>
             </a:r>
           </a:p>
@@ -5091,35 +5070,35 @@
           <a:p>
             <a:pPr lvl="0"/>
             <a:r>
-              <a:rPr lang="pt-BR" smtClean="0"/>
+              <a:rPr lang="pt-BR"/>
               <a:t>Clique para editar o texto mestre</a:t>
             </a:r>
           </a:p>
           <a:p>
             <a:pPr lvl="1"/>
             <a:r>
-              <a:rPr lang="pt-BR" smtClean="0"/>
+              <a:rPr lang="pt-BR"/>
               <a:t>Segundo nível</a:t>
             </a:r>
           </a:p>
           <a:p>
             <a:pPr lvl="2"/>
             <a:r>
-              <a:rPr lang="pt-BR" smtClean="0"/>
+              <a:rPr lang="pt-BR"/>
               <a:t>Terceiro nível</a:t>
             </a:r>
           </a:p>
           <a:p>
             <a:pPr lvl="3"/>
             <a:r>
-              <a:rPr lang="pt-BR" smtClean="0"/>
+              <a:rPr lang="pt-BR"/>
               <a:t>Quarto nível</a:t>
             </a:r>
           </a:p>
           <a:p>
             <a:pPr lvl="4"/>
             <a:r>
-              <a:rPr lang="pt-BR" smtClean="0"/>
+              <a:rPr lang="pt-BR"/>
               <a:t>Quinto nível</a:t>
             </a:r>
             <a:endParaRPr lang="en-US" dirty="0"/>
@@ -5187,7 +5166,7 @@
           <a:p>
             <a:pPr lvl="0"/>
             <a:r>
-              <a:rPr lang="pt-BR" smtClean="0"/>
+              <a:rPr lang="pt-BR"/>
               <a:t>Clique para editar o texto mestre</a:t>
             </a:r>
           </a:p>
@@ -5217,35 +5196,35 @@
           <a:p>
             <a:pPr lvl="0"/>
             <a:r>
-              <a:rPr lang="pt-BR" smtClean="0"/>
+              <a:rPr lang="pt-BR"/>
               <a:t>Clique para editar o texto mestre</a:t>
             </a:r>
           </a:p>
           <a:p>
             <a:pPr lvl="1"/>
             <a:r>
-              <a:rPr lang="pt-BR" smtClean="0"/>
+              <a:rPr lang="pt-BR"/>
               <a:t>Segundo nível</a:t>
             </a:r>
           </a:p>
           <a:p>
             <a:pPr lvl="2"/>
             <a:r>
-              <a:rPr lang="pt-BR" smtClean="0"/>
+              <a:rPr lang="pt-BR"/>
               <a:t>Terceiro nível</a:t>
             </a:r>
           </a:p>
           <a:p>
             <a:pPr lvl="3"/>
             <a:r>
-              <a:rPr lang="pt-BR" smtClean="0"/>
+              <a:rPr lang="pt-BR"/>
               <a:t>Quarto nível</a:t>
             </a:r>
           </a:p>
           <a:p>
             <a:pPr lvl="4"/>
             <a:r>
-              <a:rPr lang="pt-BR" smtClean="0"/>
+              <a:rPr lang="pt-BR"/>
               <a:t>Quinto nível</a:t>
             </a:r>
             <a:endParaRPr lang="en-US" dirty="0"/>
@@ -5270,7 +5249,7 @@
             <a:fld id="{B61BEF0D-F0BB-DE4B-95CE-6DB70DBA9567}" type="datetimeFigureOut">
               <a:rPr lang="en-US" dirty="0"/>
               <a:pPr/>
-              <a:t>11/26/2016</a:t>
+              <a:t>12/2/2016</a:t>
             </a:fld>
             <a:endParaRPr lang="en-US" dirty="0"/>
           </a:p>
@@ -5365,7 +5344,7 @@
           <a:lstStyle/>
           <a:p>
             <a:r>
-              <a:rPr lang="pt-BR" smtClean="0"/>
+              <a:rPr lang="pt-BR"/>
               <a:t>Clique para editar o título mestre</a:t>
             </a:r>
             <a:endParaRPr lang="en-US" dirty="0"/>
@@ -5390,7 +5369,7 @@
             <a:fld id="{B61BEF0D-F0BB-DE4B-95CE-6DB70DBA9567}" type="datetimeFigureOut">
               <a:rPr lang="en-US" dirty="0"/>
               <a:pPr/>
-              <a:t>11/26/2016</a:t>
+              <a:t>12/2/2016</a:t>
             </a:fld>
             <a:endParaRPr lang="en-US" dirty="0"/>
           </a:p>
@@ -5482,7 +5461,7 @@
             <a:fld id="{B61BEF0D-F0BB-DE4B-95CE-6DB70DBA9567}" type="datetimeFigureOut">
               <a:rPr lang="en-US" dirty="0"/>
               <a:pPr/>
-              <a:t>11/26/2016</a:t>
+              <a:t>12/2/2016</a:t>
             </a:fld>
             <a:endParaRPr lang="en-US" dirty="0"/>
           </a:p>
@@ -5583,7 +5562,7 @@
           </a:lstStyle>
           <a:p>
             <a:r>
-              <a:rPr lang="pt-BR" smtClean="0"/>
+              <a:rPr lang="pt-BR"/>
               <a:t>Clique para editar o título mestre</a:t>
             </a:r>
             <a:endParaRPr lang="en-US" dirty="0"/>
@@ -5614,35 +5593,35 @@
           <a:p>
             <a:pPr lvl="0"/>
             <a:r>
-              <a:rPr lang="pt-BR" smtClean="0"/>
+              <a:rPr lang="pt-BR"/>
               <a:t>Clique para editar o texto mestre</a:t>
             </a:r>
           </a:p>
           <a:p>
             <a:pPr lvl="1"/>
             <a:r>
-              <a:rPr lang="pt-BR" smtClean="0"/>
+              <a:rPr lang="pt-BR"/>
               <a:t>Segundo nível</a:t>
             </a:r>
           </a:p>
           <a:p>
             <a:pPr lvl="2"/>
             <a:r>
-              <a:rPr lang="pt-BR" smtClean="0"/>
+              <a:rPr lang="pt-BR"/>
               <a:t>Terceiro nível</a:t>
             </a:r>
           </a:p>
           <a:p>
             <a:pPr lvl="3"/>
             <a:r>
-              <a:rPr lang="pt-BR" smtClean="0"/>
+              <a:rPr lang="pt-BR"/>
               <a:t>Quarto nível</a:t>
             </a:r>
           </a:p>
           <a:p>
             <a:pPr lvl="4"/>
             <a:r>
-              <a:rPr lang="pt-BR" smtClean="0"/>
+              <a:rPr lang="pt-BR"/>
               <a:t>Quinto nível</a:t>
             </a:r>
             <a:endParaRPr lang="en-US" dirty="0"/>
@@ -5710,7 +5689,7 @@
           <a:p>
             <a:pPr lvl="0"/>
             <a:r>
-              <a:rPr lang="pt-BR" smtClean="0"/>
+              <a:rPr lang="pt-BR"/>
               <a:t>Clique para editar o texto mestre</a:t>
             </a:r>
           </a:p>
@@ -5733,7 +5712,7 @@
           <a:p>
             <a:fld id="{42A54C80-263E-416B-A8E0-580EDEADCBDC}" type="datetimeFigureOut">
               <a:rPr lang="en-US" dirty="0"/>
-              <a:t>11/26/2016</a:t>
+              <a:t>12/2/2016</a:t>
             </a:fld>
             <a:endParaRPr lang="en-US" dirty="0"/>
           </a:p>
@@ -5833,7 +5812,7 @@
           </a:lstStyle>
           <a:p>
             <a:r>
-              <a:rPr lang="pt-BR" smtClean="0"/>
+              <a:rPr lang="pt-BR"/>
               <a:t>Clique para editar o título mestre</a:t>
             </a:r>
             <a:endParaRPr lang="en-US" dirty="0"/>
@@ -5900,7 +5879,7 @@
           </a:lstStyle>
           <a:p>
             <a:r>
-              <a:rPr lang="pt-BR" smtClean="0"/>
+              <a:rPr lang="pt-BR"/>
               <a:t>Clique no ícone para adicionar uma imagem</a:t>
             </a:r>
             <a:endParaRPr lang="en-US" dirty="0"/>
@@ -5968,7 +5947,7 @@
           <a:p>
             <a:pPr lvl="0"/>
             <a:r>
-              <a:rPr lang="pt-BR" smtClean="0"/>
+              <a:rPr lang="pt-BR"/>
               <a:t>Clique para editar o texto mestre</a:t>
             </a:r>
           </a:p>
@@ -6035,7 +6014,7 @@
             <a:fld id="{B61BEF0D-F0BB-DE4B-95CE-6DB70DBA9567}" type="datetimeFigureOut">
               <a:rPr lang="en-US" dirty="0"/>
               <a:pPr/>
-              <a:t>11/26/2016</a:t>
+              <a:t>12/2/2016</a:t>
             </a:fld>
             <a:endParaRPr lang="en-US" dirty="0"/>
           </a:p>
@@ -6628,7 +6607,7 @@
           <a:lstStyle/>
           <a:p>
             <a:r>
-              <a:rPr lang="pt-BR" smtClean="0"/>
+              <a:rPr lang="pt-BR"/>
               <a:t>Clique para editar o título mestre</a:t>
             </a:r>
             <a:endParaRPr lang="en-US" dirty="0"/>
@@ -6662,35 +6641,35 @@
           <a:p>
             <a:pPr lvl="0"/>
             <a:r>
-              <a:rPr lang="pt-BR" smtClean="0"/>
+              <a:rPr lang="pt-BR"/>
               <a:t>Clique para editar o texto mestre</a:t>
             </a:r>
           </a:p>
           <a:p>
             <a:pPr lvl="1"/>
             <a:r>
-              <a:rPr lang="pt-BR" smtClean="0"/>
+              <a:rPr lang="pt-BR"/>
               <a:t>Segundo nível</a:t>
             </a:r>
           </a:p>
           <a:p>
             <a:pPr lvl="2"/>
             <a:r>
-              <a:rPr lang="pt-BR" smtClean="0"/>
+              <a:rPr lang="pt-BR"/>
               <a:t>Terceiro nível</a:t>
             </a:r>
           </a:p>
           <a:p>
             <a:pPr lvl="3"/>
             <a:r>
-              <a:rPr lang="pt-BR" smtClean="0"/>
+              <a:rPr lang="pt-BR"/>
               <a:t>Quarto nível</a:t>
             </a:r>
           </a:p>
           <a:p>
             <a:pPr lvl="4"/>
             <a:r>
-              <a:rPr lang="pt-BR" smtClean="0"/>
+              <a:rPr lang="pt-BR"/>
               <a:t>Quinto nível</a:t>
             </a:r>
             <a:endParaRPr lang="en-US" dirty="0"/>
@@ -6733,7 +6712,7 @@
             <a:fld id="{B61BEF0D-F0BB-DE4B-95CE-6DB70DBA9567}" type="datetimeFigureOut">
               <a:rPr lang="en-US" dirty="0"/>
               <a:pPr/>
-              <a:t>11/26/2016</a:t>
+              <a:t>12/2/2016</a:t>
             </a:fld>
             <a:endParaRPr lang="en-US" dirty="0"/>
           </a:p>
@@ -7274,10 +7253,9 @@
           <a:lstStyle/>
           <a:p>
             <a:r>
-              <a:rPr lang="pt-BR" dirty="0" smtClean="0"/>
+              <a:rPr lang="pt-BR" dirty="0"/>
               <a:t>CRPO/SERRA</a:t>
             </a:r>
-            <a:endParaRPr lang="pt-BR" dirty="0"/>
           </a:p>
         </p:txBody>
       </p:sp>
@@ -7305,18 +7283,9 @@
           <a:p>
             <a:pPr algn="ctr"/>
             <a:r>
-              <a:rPr lang="pt-BR" sz="3200" dirty="0" smtClean="0"/>
-              <a:t>Comando Regional de </a:t>
-            </a:r>
-            <a:r>
               <a:rPr lang="pt-BR" sz="3200" dirty="0"/>
-              <a:t>P</a:t>
-            </a:r>
-            <a:r>
-              <a:rPr lang="pt-BR" sz="3200" dirty="0" smtClean="0"/>
-              <a:t>atrulhamento Ostensivo</a:t>
-            </a:r>
-            <a:endParaRPr lang="pt-BR" sz="3200" dirty="0"/>
+              <a:t>Comando Regional de Patrulhamento Ostensivo</a:t>
+            </a:r>
           </a:p>
         </p:txBody>
       </p:sp>
@@ -7575,37 +7544,8 @@
                 <a:ea typeface="Calibri" panose="020F0502020204030204" pitchFamily="34" charset="0"/>
                 <a:cs typeface="Times New Roman" panose="02020603050405020304" pitchFamily="18" charset="0"/>
               </a:rPr>
-              <a:t>CARLOS ANDRE </a:t>
-            </a:r>
-            <a:r>
-              <a:rPr lang="pt-BR" sz="1600" b="1" dirty="0" smtClean="0">
-                <a:latin typeface="Arial" panose="020B0604020202020204" pitchFamily="34" charset="0"/>
-                <a:ea typeface="Calibri" panose="020F0502020204030204" pitchFamily="34" charset="0"/>
-                <a:cs typeface="Times New Roman" panose="02020603050405020304" pitchFamily="18" charset="0"/>
-              </a:rPr>
-              <a:t>ANTUNES, CLEI </a:t>
-            </a:r>
-            <a:r>
-              <a:rPr lang="pt-BR" sz="1600" b="1" dirty="0">
-                <a:latin typeface="Arial" panose="020B0604020202020204" pitchFamily="34" charset="0"/>
-                <a:ea typeface="Calibri" panose="020F0502020204030204" pitchFamily="34" charset="0"/>
-                <a:cs typeface="Times New Roman" panose="02020603050405020304" pitchFamily="18" charset="0"/>
-              </a:rPr>
-              <a:t>EVERS </a:t>
-            </a:r>
-            <a:r>
-              <a:rPr lang="pt-BR" sz="1600" b="1" dirty="0" smtClean="0">
-                <a:latin typeface="Arial" panose="020B0604020202020204" pitchFamily="34" charset="0"/>
-                <a:ea typeface="Calibri" panose="020F0502020204030204" pitchFamily="34" charset="0"/>
-                <a:cs typeface="Times New Roman" panose="02020603050405020304" pitchFamily="18" charset="0"/>
-              </a:rPr>
-              <a:t>FLORES, DANIEL RIBEIRO, </a:t>
-            </a:r>
-            <a:endParaRPr lang="pt-BR" sz="1600" b="1" dirty="0">
-              <a:latin typeface="Arial" panose="020B0604020202020204" pitchFamily="34" charset="0"/>
-              <a:ea typeface="Calibri" panose="020F0502020204030204" pitchFamily="34" charset="0"/>
-              <a:cs typeface="Times New Roman" panose="02020603050405020304" pitchFamily="18" charset="0"/>
-            </a:endParaRPr>
+              <a:t>CARLOS ANDRE ANTUNES, CLEI EVERS FLORES, DANIEL RIBEIRO, </a:t>
+            </a:r>
           </a:p>
           <a:p>
             <a:pPr algn="ctr">
@@ -7617,20 +7557,12 @@
               </a:spcAft>
             </a:pPr>
             <a:r>
-              <a:rPr lang="pt-BR" sz="1600" b="1" dirty="0" smtClean="0">
-                <a:latin typeface="Arial" panose="020B0604020202020204" pitchFamily="34" charset="0"/>
-                <a:ea typeface="Calibri" panose="020F0502020204030204" pitchFamily="34" charset="0"/>
-                <a:cs typeface="Times New Roman" panose="02020603050405020304" pitchFamily="18" charset="0"/>
-              </a:rPr>
-              <a:t>DIOGO PARADELLA, LUIS </a:t>
-            </a:r>
-            <a:r>
               <a:rPr lang="pt-BR" sz="1600" b="1" dirty="0">
                 <a:latin typeface="Arial" panose="020B0604020202020204" pitchFamily="34" charset="0"/>
                 <a:ea typeface="Calibri" panose="020F0502020204030204" pitchFamily="34" charset="0"/>
                 <a:cs typeface="Times New Roman" panose="02020603050405020304" pitchFamily="18" charset="0"/>
               </a:rPr>
-              <a:t>DEMETRIUS TELES</a:t>
+              <a:t>DIOGO PARADELLA, LUIS DEMETRIUS TELES</a:t>
             </a:r>
             <a:endParaRPr lang="pt-BR" sz="1600" dirty="0">
               <a:effectLst/>
@@ -7651,13 +7583,6 @@
   <p:clrMapOvr>
     <a:masterClrMapping/>
   </p:clrMapOvr>
-  <p:timing>
-    <p:tnLst>
-      <p:par>
-        <p:cTn id="1" dur="indefinite" restart="never" nodeType="tmRoot"/>
-      </p:par>
-    </p:tnLst>
-  </p:timing>
 </p:sld>
 </file>
 
@@ -7701,10 +7626,9 @@
           <a:lstStyle/>
           <a:p>
             <a:r>
-              <a:rPr lang="pt-BR" dirty="0" smtClean="0"/>
+              <a:rPr lang="pt-BR" dirty="0"/>
               <a:t>Futuras Implementações</a:t>
             </a:r>
-            <a:endParaRPr lang="pt-BR" dirty="0"/>
           </a:p>
         </p:txBody>
       </p:sp>
@@ -7813,7 +7737,7 @@
               <a:buChar char="Ø"/>
             </a:pPr>
             <a:r>
-              <a:rPr lang="pt-BR" sz="2800" dirty="0" smtClean="0">
+              <a:rPr lang="pt-BR" sz="2800" dirty="0">
                 <a:solidFill>
                   <a:schemeClr val="tx1"/>
                 </a:solidFill>
@@ -7833,7 +7757,7 @@
               <a:buChar char="Ø"/>
             </a:pPr>
             <a:r>
-              <a:rPr lang="pt-BR" sz="2800" dirty="0" smtClean="0">
+              <a:rPr lang="pt-BR" sz="2800" dirty="0">
                 <a:solidFill>
                   <a:schemeClr val="tx1"/>
                 </a:solidFill>
@@ -7853,7 +7777,7 @@
               <a:buChar char="Ø"/>
             </a:pPr>
             <a:r>
-              <a:rPr lang="pt-BR" sz="2800" dirty="0" smtClean="0">
+              <a:rPr lang="pt-BR" sz="2800" dirty="0">
                 <a:solidFill>
                   <a:schemeClr val="tx1"/>
                 </a:solidFill>
@@ -7873,7 +7797,7 @@
               <a:buChar char="Ø"/>
             </a:pPr>
             <a:r>
-              <a:rPr lang="pt-BR" sz="2800" dirty="0" smtClean="0">
+              <a:rPr lang="pt-BR" sz="2800" dirty="0">
                 <a:solidFill>
                   <a:schemeClr val="tx1"/>
                 </a:solidFill>
@@ -7892,7 +7816,7 @@
               <a:buFont typeface="Wingdings" panose="05000000000000000000" pitchFamily="2" charset="2"/>
               <a:buChar char="Ø"/>
             </a:pPr>
-            <a:endParaRPr lang="pt-BR" sz="2800" dirty="0" smtClean="0">
+            <a:endParaRPr lang="pt-BR" sz="2800" dirty="0">
               <a:solidFill>
                 <a:schemeClr val="tx1"/>
               </a:solidFill>
@@ -7907,7 +7831,7 @@
                 <a:schemeClr val="accent1"/>
               </a:buClr>
             </a:pPr>
-            <a:endParaRPr lang="pt-BR" sz="2800" dirty="0" smtClean="0">
+            <a:endParaRPr lang="pt-BR" sz="2800" dirty="0">
               <a:solidFill>
                 <a:schemeClr val="tx1"/>
               </a:solidFill>
@@ -7921,7 +7845,7 @@
               <a:buFont typeface="Wingdings" panose="05000000000000000000" pitchFamily="2" charset="2"/>
               <a:buChar char="Ø"/>
             </a:pPr>
-            <a:endParaRPr lang="pt-BR" sz="2400" dirty="0" smtClean="0">
+            <a:endParaRPr lang="pt-BR" sz="2400" dirty="0">
               <a:solidFill>
                 <a:schemeClr val="tx1"/>
               </a:solidFill>
@@ -7982,13 +7906,6 @@
   <p:clrMapOvr>
     <a:masterClrMapping/>
   </p:clrMapOvr>
-  <p:timing>
-    <p:tnLst>
-      <p:par>
-        <p:cTn id="1" dur="indefinite" restart="never" nodeType="tmRoot"/>
-      </p:par>
-    </p:tnLst>
-  </p:timing>
 </p:sld>
 </file>
 
@@ -8061,10 +7978,9 @@
           <a:lstStyle/>
           <a:p>
             <a:r>
-              <a:rPr lang="pt-BR" dirty="0" smtClean="0"/>
+              <a:rPr lang="pt-BR" dirty="0"/>
               <a:t>Conclusão</a:t>
             </a:r>
-            <a:endParaRPr lang="pt-BR" dirty="0"/>
           </a:p>
         </p:txBody>
       </p:sp>
@@ -8105,15 +8021,7 @@
                 <a:ea typeface="Calibri" panose="020F0502020204030204" pitchFamily="34" charset="0"/>
                 <a:cs typeface="Times New Roman" panose="02020603050405020304" pitchFamily="18" charset="0"/>
               </a:rPr>
-              <a:t>A realidade vista nas repartições públicas, no quesito controle dos </a:t>
-            </a:r>
-            <a:r>
-              <a:rPr lang="pt-BR" sz="2400" dirty="0" smtClean="0">
-                <a:latin typeface="Arial" panose="020B0604020202020204" pitchFamily="34" charset="0"/>
-                <a:ea typeface="Calibri" panose="020F0502020204030204" pitchFamily="34" charset="0"/>
-                <a:cs typeface="Times New Roman" panose="02020603050405020304" pitchFamily="18" charset="0"/>
-              </a:rPr>
-              <a:t>processos</a:t>
+              <a:t>A realidade vista nas repartições públicas, no quesito controle dos processos</a:t>
             </a:r>
           </a:p>
           <a:p>
@@ -8128,44 +8036,12 @@
               <a:buChar char="Ø"/>
             </a:pPr>
             <a:r>
-              <a:rPr lang="pt-BR" sz="2400" dirty="0" smtClean="0">
-                <a:latin typeface="Arial" panose="020B0604020202020204" pitchFamily="34" charset="0"/>
-                <a:ea typeface="Calibri" panose="020F0502020204030204" pitchFamily="34" charset="0"/>
-                <a:cs typeface="Times New Roman" panose="02020603050405020304" pitchFamily="18" charset="0"/>
-              </a:rPr>
-              <a:t>O </a:t>
-            </a:r>
-            <a:r>
               <a:rPr lang="pt-BR" sz="2400" dirty="0">
                 <a:latin typeface="Arial" panose="020B0604020202020204" pitchFamily="34" charset="0"/>
                 <a:ea typeface="Calibri" panose="020F0502020204030204" pitchFamily="34" charset="0"/>
                 <a:cs typeface="Times New Roman" panose="02020603050405020304" pitchFamily="18" charset="0"/>
               </a:rPr>
-              <a:t>objetivo </a:t>
-            </a:r>
-            <a:r>
-              <a:rPr lang="pt-BR" sz="2400" dirty="0" smtClean="0">
-                <a:latin typeface="Arial" panose="020B0604020202020204" pitchFamily="34" charset="0"/>
-                <a:ea typeface="Calibri" panose="020F0502020204030204" pitchFamily="34" charset="0"/>
-                <a:cs typeface="Times New Roman" panose="02020603050405020304" pitchFamily="18" charset="0"/>
-              </a:rPr>
-              <a:t>deste </a:t>
-            </a:r>
-            <a:r>
-              <a:rPr lang="pt-BR" sz="2400" dirty="0">
-                <a:latin typeface="Arial" panose="020B0604020202020204" pitchFamily="34" charset="0"/>
-                <a:ea typeface="Calibri" panose="020F0502020204030204" pitchFamily="34" charset="0"/>
-                <a:cs typeface="Times New Roman" panose="02020603050405020304" pitchFamily="18" charset="0"/>
-              </a:rPr>
-              <a:t>estudo foi alcançado e permitirá aos usuários uma automatização do fluxo de trabalho, proporcionando-lhes maior controle sobre as escalas e menor probabilidade de </a:t>
-            </a:r>
-            <a:r>
-              <a:rPr lang="pt-BR" sz="2400" dirty="0" smtClean="0">
-                <a:latin typeface="Arial" panose="020B0604020202020204" pitchFamily="34" charset="0"/>
-                <a:ea typeface="Calibri" panose="020F0502020204030204" pitchFamily="34" charset="0"/>
-                <a:cs typeface="Times New Roman" panose="02020603050405020304" pitchFamily="18" charset="0"/>
-              </a:rPr>
-              <a:t>erro.</a:t>
+              <a:t>O objetivo deste estudo foi alcançado e permitirá aos usuários uma automatização do fluxo de trabalho, proporcionando-lhes maior controle sobre as escalas e menor probabilidade de erro.</a:t>
             </a:r>
             <a:endParaRPr lang="pt-BR" sz="2000" dirty="0">
               <a:latin typeface="Calibri" panose="020F0502020204030204" pitchFamily="34" charset="0"/>
@@ -8185,28 +8061,12 @@
               <a:buChar char="Ø"/>
             </a:pPr>
             <a:r>
-              <a:rPr lang="pt-BR" sz="2400" dirty="0" smtClean="0">
-                <a:latin typeface="Arial" panose="020B0604020202020204" pitchFamily="34" charset="0"/>
-                <a:ea typeface="Calibri" panose="020F0502020204030204" pitchFamily="34" charset="0"/>
-                <a:cs typeface="Times New Roman" panose="02020603050405020304" pitchFamily="18" charset="0"/>
-              </a:rPr>
-              <a:t>Uma </a:t>
-            </a:r>
-            <a:r>
               <a:rPr lang="pt-BR" sz="2400" dirty="0">
                 <a:latin typeface="Arial" panose="020B0604020202020204" pitchFamily="34" charset="0"/>
                 <a:ea typeface="Calibri" panose="020F0502020204030204" pitchFamily="34" charset="0"/>
                 <a:cs typeface="Times New Roman" panose="02020603050405020304" pitchFamily="18" charset="0"/>
               </a:rPr>
-              <a:t>ferramenta deste porte se define não apenas como um simples software de controle, e sim como uma ferramenta de apoio nas tomadas de decisão dos diferentes setores</a:t>
-            </a:r>
-            <a:r>
-              <a:rPr lang="pt-BR" sz="2400" dirty="0" smtClean="0">
-                <a:latin typeface="Arial" panose="020B0604020202020204" pitchFamily="34" charset="0"/>
-                <a:ea typeface="Calibri" panose="020F0502020204030204" pitchFamily="34" charset="0"/>
-                <a:cs typeface="Times New Roman" panose="02020603050405020304" pitchFamily="18" charset="0"/>
-              </a:rPr>
-              <a:t>.</a:t>
+              <a:t>Uma ferramenta deste porte se define não apenas como um simples software de controle, e sim como uma ferramenta de apoio nas tomadas de decisão dos diferentes setores.</a:t>
             </a:r>
             <a:endParaRPr lang="pt-BR" sz="2000" dirty="0">
               <a:effectLst/>
@@ -8227,13 +8087,6 @@
   <p:clrMapOvr>
     <a:masterClrMapping/>
   </p:clrMapOvr>
-  <p:timing>
-    <p:tnLst>
-      <p:par>
-        <p:cTn id="1" dur="indefinite" restart="never" nodeType="tmRoot"/>
-      </p:par>
-    </p:tnLst>
-  </p:timing>
 </p:sld>
 </file>
 
@@ -8306,10 +8159,9 @@
           <a:lstStyle/>
           <a:p>
             <a:r>
-              <a:rPr lang="pt-BR" dirty="0" smtClean="0"/>
+              <a:rPr lang="pt-BR" dirty="0"/>
               <a:t>Referencias Bibliográficas</a:t>
             </a:r>
-            <a:endParaRPr lang="pt-BR" dirty="0"/>
           </a:p>
         </p:txBody>
       </p:sp>
@@ -8429,13 +8281,6 @@
   <p:clrMapOvr>
     <a:masterClrMapping/>
   </p:clrMapOvr>
-  <p:timing>
-    <p:tnLst>
-      <p:par>
-        <p:cTn id="1" dur="indefinite" restart="never" nodeType="tmRoot"/>
-      </p:par>
-    </p:tnLst>
-  </p:timing>
 </p:sld>
 </file>
 
@@ -8479,10 +8324,9 @@
           <a:lstStyle/>
           <a:p>
             <a:r>
-              <a:rPr lang="pt-BR" dirty="0" smtClean="0"/>
+              <a:rPr lang="pt-BR" dirty="0"/>
               <a:t>CRPO</a:t>
             </a:r>
-            <a:endParaRPr lang="pt-BR" dirty="0"/>
           </a:p>
         </p:txBody>
       </p:sp>
@@ -8772,7 +8616,7 @@
               <a:buChar char="Ø"/>
             </a:pPr>
             <a:r>
-              <a:rPr lang="pt-BR" sz="2800" dirty="0" smtClean="0"/>
+              <a:rPr lang="pt-BR" sz="2800" dirty="0"/>
               <a:t>Comando Regional de Patrulhamento Ostensivo.</a:t>
             </a:r>
           </a:p>
@@ -8786,19 +8630,7 @@
             </a:pPr>
             <a:r>
               <a:rPr lang="pt-BR" sz="2800" dirty="0"/>
-              <a:t>F</a:t>
-            </a:r>
-            <a:r>
-              <a:rPr lang="pt-BR" sz="2800" dirty="0" smtClean="0"/>
-              <a:t>oi </a:t>
-            </a:r>
-            <a:r>
-              <a:rPr lang="pt-BR" sz="2800" dirty="0"/>
-              <a:t>criado no dia 09 de dezembro de 1986 </a:t>
-            </a:r>
-            <a:r>
-              <a:rPr lang="pt-BR" sz="2800" dirty="0" smtClean="0"/>
-              <a:t>.</a:t>
+              <a:t>Foi criado no dia 09 de dezembro de 1986 .</a:t>
             </a:r>
           </a:p>
           <a:p>
@@ -8819,11 +8651,7 @@
             </a:r>
             <a:r>
               <a:rPr lang="pt-BR" sz="2800" dirty="0"/>
-              <a:t>, n.º </a:t>
-            </a:r>
-            <a:r>
-              <a:rPr lang="pt-BR" sz="2800" dirty="0" smtClean="0"/>
-              <a:t>1110, centro – Caxias do Sul/RS.</a:t>
+              <a:t>, n.º 1110, centro – Caxias do Sul/RS.</a:t>
             </a:r>
           </a:p>
           <a:p>
@@ -8836,21 +8664,8 @@
             </a:pPr>
             <a:r>
               <a:rPr lang="pt-BR" sz="2800" dirty="0"/>
-              <a:t>C</a:t>
-            </a:r>
-            <a:r>
-              <a:rPr lang="pt-BR" sz="2800" dirty="0" smtClean="0"/>
-              <a:t>oordena </a:t>
-            </a:r>
-            <a:r>
-              <a:rPr lang="pt-BR" sz="2800" dirty="0"/>
-              <a:t>o policiamento ostensivo em 68 </a:t>
-            </a:r>
-            <a:r>
-              <a:rPr lang="pt-BR" sz="2800" dirty="0" smtClean="0"/>
-              <a:t>municípios.</a:t>
-            </a:r>
-            <a:endParaRPr lang="pt-BR" sz="2800" dirty="0"/>
+              <a:t>Coordena o policiamento ostensivo em 68 municípios.</a:t>
+            </a:r>
           </a:p>
         </p:txBody>
       </p:sp>
@@ -8864,13 +8679,6 @@
   <p:clrMapOvr>
     <a:masterClrMapping/>
   </p:clrMapOvr>
-  <p:timing>
-    <p:tnLst>
-      <p:par>
-        <p:cTn id="1" dur="indefinite" restart="never" nodeType="tmRoot"/>
-      </p:par>
-    </p:tnLst>
-  </p:timing>
 </p:sld>
 </file>
 
@@ -8914,10 +8722,9 @@
           <a:lstStyle/>
           <a:p>
             <a:r>
-              <a:rPr lang="pt-BR" dirty="0" smtClean="0"/>
+              <a:rPr lang="pt-BR" dirty="0"/>
               <a:t>Introdução</a:t>
             </a:r>
-            <a:endParaRPr lang="pt-BR" dirty="0"/>
           </a:p>
         </p:txBody>
       </p:sp>
@@ -9204,32 +9011,8 @@
               <a:buChar char="Ø"/>
             </a:pPr>
             <a:r>
-              <a:rPr lang="pt-BR" sz="2800" dirty="0" smtClean="0"/>
-              <a:t>Este </a:t>
-            </a:r>
-            <a:r>
               <a:rPr lang="pt-BR" sz="2800" dirty="0"/>
-              <a:t>trabalho </a:t>
-            </a:r>
-            <a:r>
-              <a:rPr lang="pt-BR" sz="2800" dirty="0" smtClean="0"/>
-              <a:t>apresenta um </a:t>
-            </a:r>
-            <a:r>
-              <a:rPr lang="pt-BR" sz="2800" dirty="0"/>
-              <a:t>sistema de gerenciamento </a:t>
-            </a:r>
-            <a:r>
-              <a:rPr lang="pt-BR" sz="2800" dirty="0" smtClean="0"/>
-              <a:t>de fluxo </a:t>
-            </a:r>
-            <a:r>
-              <a:rPr lang="pt-BR" sz="2800" dirty="0"/>
-              <a:t>de </a:t>
-            </a:r>
-            <a:r>
-              <a:rPr lang="pt-BR" sz="2800" dirty="0" smtClean="0"/>
-              <a:t>documentos;</a:t>
+              <a:t>Este trabalho apresenta um sistema de gerenciamento de fluxo de documentos;</a:t>
             </a:r>
           </a:p>
           <a:p>
@@ -9238,24 +9021,8 @@
               <a:buChar char="Ø"/>
             </a:pPr>
             <a:r>
-              <a:rPr lang="pt-BR" sz="2800" dirty="0" smtClean="0"/>
-              <a:t>O </a:t>
-            </a:r>
-            <a:r>
               <a:rPr lang="pt-BR" sz="2800" dirty="0"/>
-              <a:t>sistema </a:t>
-            </a:r>
-            <a:r>
-              <a:rPr lang="pt-BR" sz="2800" dirty="0" smtClean="0"/>
-              <a:t>automatiza o </a:t>
-            </a:r>
-            <a:r>
-              <a:rPr lang="pt-BR" sz="2800" dirty="0"/>
-              <a:t>gerenciamento </a:t>
-            </a:r>
-            <a:r>
-              <a:rPr lang="pt-BR" sz="2800" dirty="0" smtClean="0"/>
-              <a:t>de carga horária e escalas; </a:t>
+              <a:t>O sistema automatiza o gerenciamento de carga horária e escalas; </a:t>
             </a:r>
           </a:p>
           <a:p>
@@ -9264,16 +9031,8 @@
               <a:buChar char="Ø"/>
             </a:pPr>
             <a:r>
-              <a:rPr lang="pt-BR" sz="2800" dirty="0" smtClean="0"/>
-              <a:t>Controle </a:t>
-            </a:r>
-            <a:r>
               <a:rPr lang="pt-BR" sz="2800" dirty="0"/>
-              <a:t>de boletins administrativos </a:t>
-            </a:r>
-            <a:r>
-              <a:rPr lang="pt-BR" sz="2800" dirty="0" smtClean="0"/>
-              <a:t>internos e externos;</a:t>
+              <a:t>Controle de boletins administrativos internos e externos;</a:t>
             </a:r>
           </a:p>
           <a:p>
@@ -9282,7 +9041,7 @@
               <a:buChar char="Ø"/>
             </a:pPr>
             <a:r>
-              <a:rPr lang="pt-BR" sz="2800" dirty="0" smtClean="0"/>
+              <a:rPr lang="pt-BR" sz="2800" dirty="0"/>
               <a:t>Agilizar e padronizar processo de apontamento de horas;</a:t>
             </a:r>
           </a:p>
@@ -9292,7 +9051,7 @@
               <a:buChar char="Ø"/>
             </a:pPr>
             <a:r>
-              <a:rPr lang="pt-BR" sz="2800" dirty="0" smtClean="0"/>
+              <a:rPr lang="pt-BR" sz="2800" dirty="0"/>
               <a:t>Gestão administrativa do efetivo;</a:t>
             </a:r>
           </a:p>
@@ -9308,13 +9067,6 @@
   <p:clrMapOvr>
     <a:masterClrMapping/>
   </p:clrMapOvr>
-  <p:timing>
-    <p:tnLst>
-      <p:par>
-        <p:cTn id="1" dur="indefinite" restart="never" nodeType="tmRoot"/>
-      </p:par>
-    </p:tnLst>
-  </p:timing>
 </p:sld>
 </file>
 
@@ -9358,10 +9110,9 @@
           <a:lstStyle/>
           <a:p>
             <a:r>
-              <a:rPr lang="pt-BR" dirty="0" smtClean="0"/>
+              <a:rPr lang="pt-BR" dirty="0"/>
               <a:t>Introdução</a:t>
             </a:r>
-            <a:endParaRPr lang="pt-BR" dirty="0"/>
           </a:p>
         </p:txBody>
       </p:sp>
@@ -9648,16 +9399,8 @@
               <a:buChar char="Ø"/>
             </a:pPr>
             <a:r>
-              <a:rPr lang="pt-BR" sz="2800" dirty="0" smtClean="0"/>
-              <a:t>Utiliza programação </a:t>
-            </a:r>
-            <a:r>
               <a:rPr lang="pt-BR" sz="2800" dirty="0"/>
-              <a:t>orientado a </a:t>
-            </a:r>
-            <a:r>
-              <a:rPr lang="pt-BR" sz="2800" dirty="0" smtClean="0"/>
-              <a:t>objetos;</a:t>
+              <a:t>Utiliza programação orientado a objetos;</a:t>
             </a:r>
           </a:p>
           <a:p>
@@ -9666,16 +9409,8 @@
               <a:buChar char="Ø"/>
             </a:pPr>
             <a:r>
-              <a:rPr lang="pt-BR" sz="2800" dirty="0" smtClean="0"/>
-              <a:t>Levantamento </a:t>
-            </a:r>
-            <a:r>
               <a:rPr lang="pt-BR" sz="2800" dirty="0"/>
-              <a:t>dos requisitos </a:t>
-            </a:r>
-            <a:r>
-              <a:rPr lang="pt-BR" sz="2800" dirty="0" smtClean="0"/>
-              <a:t>;</a:t>
+              <a:t>Levantamento dos requisitos ;</a:t>
             </a:r>
           </a:p>
           <a:p>
@@ -9684,16 +9419,8 @@
               <a:buChar char="Ø"/>
             </a:pPr>
             <a:r>
-              <a:rPr lang="pt-BR" sz="2800" dirty="0" smtClean="0"/>
-              <a:t>Linguagem </a:t>
-            </a:r>
-            <a:r>
               <a:rPr lang="pt-BR" sz="2800" dirty="0"/>
-              <a:t>UML </a:t>
-            </a:r>
-            <a:r>
-              <a:rPr lang="pt-BR" sz="2800" dirty="0" smtClean="0"/>
-              <a:t>;</a:t>
+              <a:t>Linguagem UML ;</a:t>
             </a:r>
           </a:p>
           <a:p>
@@ -9702,16 +9429,8 @@
               <a:buChar char="Ø"/>
             </a:pPr>
             <a:r>
-              <a:rPr lang="pt-BR" sz="2800" dirty="0" smtClean="0"/>
-              <a:t>Diagramas </a:t>
-            </a:r>
-            <a:r>
               <a:rPr lang="pt-BR" sz="2800" dirty="0"/>
-              <a:t>de casos de uso, classes e </a:t>
-            </a:r>
-            <a:r>
-              <a:rPr lang="pt-BR" sz="2800" dirty="0" smtClean="0"/>
-              <a:t>sequencia;</a:t>
+              <a:t>Diagramas de casos de uso, classes e sequencia;</a:t>
             </a:r>
           </a:p>
           <a:p>
@@ -9720,10 +9439,9 @@
               <a:buChar char="Ø"/>
             </a:pPr>
             <a:r>
-              <a:rPr lang="pt-BR" sz="2800" dirty="0" smtClean="0"/>
+              <a:rPr lang="pt-BR" sz="2800" dirty="0"/>
               <a:t>Banco de dados PostgreSQL;</a:t>
             </a:r>
-            <a:endParaRPr lang="pt-BR" sz="2800" dirty="0"/>
           </a:p>
           <a:p>
             <a:pPr>
@@ -9731,11 +9449,11 @@
               <a:buChar char="Ø"/>
             </a:pPr>
             <a:r>
-              <a:rPr lang="pt-BR" sz="2800" dirty="0" err="1" smtClean="0"/>
+              <a:rPr lang="pt-BR" sz="2800" dirty="0" err="1"/>
               <a:t>Ruby</a:t>
             </a:r>
             <a:r>
-              <a:rPr lang="pt-BR" sz="2800" dirty="0" smtClean="0"/>
+              <a:rPr lang="pt-BR" sz="2800" dirty="0"/>
               <a:t> </a:t>
             </a:r>
             <a:r>
@@ -9747,19 +9465,19 @@
               <a:t> </a:t>
             </a:r>
             <a:r>
-              <a:rPr lang="pt-BR" sz="2800" dirty="0" err="1" smtClean="0"/>
+              <a:rPr lang="pt-BR" sz="2800" dirty="0" err="1"/>
               <a:t>Rails</a:t>
             </a:r>
             <a:r>
-              <a:rPr lang="pt-BR" sz="2800" dirty="0" smtClean="0"/>
+              <a:rPr lang="pt-BR" sz="2800" dirty="0"/>
               <a:t>, CSS3, HTML 5, </a:t>
             </a:r>
             <a:r>
-              <a:rPr lang="pt-BR" sz="2800" dirty="0" err="1" smtClean="0"/>
+              <a:rPr lang="pt-BR" sz="2800" dirty="0" err="1"/>
               <a:t>Jquery</a:t>
             </a:r>
             <a:r>
-              <a:rPr lang="pt-BR" sz="2800" dirty="0" smtClean="0"/>
+              <a:rPr lang="pt-BR" sz="2800" dirty="0"/>
               <a:t>;</a:t>
             </a:r>
           </a:p>
@@ -9782,13 +9500,6 @@
   <p:clrMapOvr>
     <a:masterClrMapping/>
   </p:clrMapOvr>
-  <p:timing>
-    <p:tnLst>
-      <p:par>
-        <p:cTn id="1" dur="indefinite" restart="never" nodeType="tmRoot"/>
-      </p:par>
-    </p:tnLst>
-  </p:timing>
 </p:sld>
 </file>
 
@@ -9832,10 +9543,9 @@
           <a:lstStyle/>
           <a:p>
             <a:r>
-              <a:rPr lang="pt-BR" dirty="0" smtClean="0"/>
+              <a:rPr lang="pt-BR" dirty="0"/>
               <a:t>Funcionalidades:</a:t>
             </a:r>
-            <a:endParaRPr lang="pt-BR" dirty="0"/>
           </a:p>
         </p:txBody>
       </p:sp>
@@ -9944,7 +9654,7 @@
               <a:buChar char="Ø"/>
             </a:pPr>
             <a:r>
-              <a:rPr lang="pt-BR" sz="2800" dirty="0" smtClean="0">
+              <a:rPr lang="pt-BR" sz="2800" dirty="0">
                 <a:solidFill>
                   <a:schemeClr val="tx1"/>
                 </a:solidFill>
@@ -9964,12 +9674,12 @@
               <a:buChar char="Ø"/>
             </a:pPr>
             <a:r>
-              <a:rPr lang="pt-BR" sz="2800" dirty="0" smtClean="0">
+              <a:rPr lang="pt-BR" sz="2800" dirty="0">
                 <a:solidFill>
                   <a:schemeClr val="tx1"/>
                 </a:solidFill>
               </a:rPr>
-              <a:t>Solicitação de licenças, férias, afastamento com níveis de aprovação;</a:t>
+              <a:t>Solicitações, *Licenças, *Férias, *Dispensas;</a:t>
             </a:r>
           </a:p>
           <a:p>
@@ -9984,7 +9694,7 @@
               <a:buChar char="Ø"/>
             </a:pPr>
             <a:r>
-              <a:rPr lang="pt-BR" sz="2800" dirty="0" smtClean="0">
+              <a:rPr lang="pt-BR" sz="2800" dirty="0">
                 <a:solidFill>
                   <a:schemeClr val="tx1"/>
                 </a:solidFill>
@@ -10004,27 +9714,7 @@
               <a:buChar char="Ø"/>
             </a:pPr>
             <a:r>
-              <a:rPr lang="pt-BR" sz="2800" dirty="0" smtClean="0">
-                <a:solidFill>
-                  <a:schemeClr val="tx1"/>
-                </a:solidFill>
-              </a:rPr>
-              <a:t>Gerenciamento de horas Extras;</a:t>
-            </a:r>
-          </a:p>
-          <a:p>
-            <a:pPr marL="342900" indent="-342900">
-              <a:lnSpc>
-                <a:spcPct val="150000"/>
-              </a:lnSpc>
-              <a:buClr>
-                <a:schemeClr val="accent1"/>
-              </a:buClr>
-              <a:buFont typeface="Wingdings" panose="05000000000000000000" pitchFamily="2" charset="2"/>
-              <a:buChar char="Ø"/>
-            </a:pPr>
-            <a:r>
-              <a:rPr lang="pt-BR" sz="2800" dirty="0" smtClean="0">
+              <a:rPr lang="pt-BR" sz="2800" dirty="0">
                 <a:solidFill>
                   <a:schemeClr val="tx1"/>
                 </a:solidFill>
@@ -10040,7 +9730,7 @@
               <a:buFont typeface="Wingdings" panose="05000000000000000000" pitchFamily="2" charset="2"/>
               <a:buChar char="Ø"/>
             </a:pPr>
-            <a:endParaRPr lang="pt-BR" sz="2400" dirty="0" smtClean="0">
+            <a:endParaRPr lang="pt-BR" sz="2400" dirty="0">
               <a:solidFill>
                 <a:schemeClr val="tx1"/>
               </a:solidFill>
@@ -10054,7 +9744,7 @@
               <a:buFont typeface="Wingdings" panose="05000000000000000000" pitchFamily="2" charset="2"/>
               <a:buChar char="Ø"/>
             </a:pPr>
-            <a:endParaRPr lang="pt-BR" sz="2400" dirty="0" smtClean="0">
+            <a:endParaRPr lang="pt-BR" sz="2400" dirty="0">
               <a:solidFill>
                 <a:schemeClr val="tx1"/>
               </a:solidFill>
@@ -10115,13 +9805,6 @@
   <p:clrMapOvr>
     <a:masterClrMapping/>
   </p:clrMapOvr>
-  <p:timing>
-    <p:tnLst>
-      <p:par>
-        <p:cTn id="1" dur="indefinite" restart="never" nodeType="tmRoot"/>
-      </p:par>
-    </p:tnLst>
-  </p:timing>
 </p:sld>
 </file>
 
@@ -10165,10 +9848,9 @@
           <a:lstStyle/>
           <a:p>
             <a:r>
-              <a:rPr lang="pt-BR" dirty="0" smtClean="0"/>
+              <a:rPr lang="pt-BR" dirty="0"/>
               <a:t>Interface - Protótipo</a:t>
             </a:r>
-            <a:endParaRPr lang="pt-BR" dirty="0"/>
           </a:p>
         </p:txBody>
       </p:sp>
@@ -10267,18 +9949,13 @@
           </a:lstStyle>
           <a:p>
             <a:r>
-              <a:rPr lang="pt-BR" sz="2000" dirty="0" smtClean="0">
+              <a:rPr lang="pt-BR" sz="2000" dirty="0">
                 <a:solidFill>
                   <a:schemeClr val="tx1"/>
                 </a:solidFill>
               </a:rPr>
               <a:t>Interface - Home</a:t>
             </a:r>
-            <a:endParaRPr lang="pt-BR" sz="2000" dirty="0">
-              <a:solidFill>
-                <a:schemeClr val="tx1"/>
-              </a:solidFill>
-            </a:endParaRPr>
           </a:p>
         </p:txBody>
       </p:sp>
@@ -10292,13 +9969,6 @@
   <p:clrMapOvr>
     <a:masterClrMapping/>
   </p:clrMapOvr>
-  <p:timing>
-    <p:tnLst>
-      <p:par>
-        <p:cTn id="1" dur="indefinite" restart="never" nodeType="tmRoot"/>
-      </p:par>
-    </p:tnLst>
-  </p:timing>
 </p:sld>
 </file>
 
@@ -10342,10 +10012,9 @@
           <a:lstStyle/>
           <a:p>
             <a:r>
-              <a:rPr lang="pt-BR" dirty="0" smtClean="0"/>
+              <a:rPr lang="pt-BR" dirty="0"/>
               <a:t>Diagrama de Classes </a:t>
             </a:r>
-            <a:endParaRPr lang="pt-BR" dirty="0"/>
           </a:p>
         </p:txBody>
       </p:sp>
@@ -10483,7 +10152,7 @@
               <a:buChar char="Ø"/>
             </a:pPr>
             <a:r>
-              <a:rPr lang="pt-BR" sz="2800" dirty="0" smtClean="0">
+              <a:rPr lang="pt-BR" sz="2800" dirty="0">
                 <a:solidFill>
                   <a:schemeClr val="tx1"/>
                 </a:solidFill>
@@ -10491,7 +10160,7 @@
               <a:t>27 </a:t>
             </a:r>
             <a:r>
-              <a:rPr lang="pt-BR" sz="2800" dirty="0" err="1" smtClean="0">
+              <a:rPr lang="pt-BR" sz="2800" dirty="0" err="1">
                 <a:solidFill>
                   <a:schemeClr val="tx1"/>
                 </a:solidFill>
@@ -10499,7 +10168,7 @@
               <a:t>Controllers</a:t>
             </a:r>
             <a:r>
-              <a:rPr lang="pt-BR" sz="2800" dirty="0" smtClean="0">
+              <a:rPr lang="pt-BR" sz="2800" dirty="0">
                 <a:solidFill>
                   <a:schemeClr val="tx1"/>
                 </a:solidFill>
@@ -10507,7 +10176,7 @@
               <a:t>; 28 </a:t>
             </a:r>
             <a:r>
-              <a:rPr lang="pt-BR" sz="2800" dirty="0" err="1" smtClean="0">
+              <a:rPr lang="pt-BR" sz="2800" dirty="0" err="1">
                 <a:solidFill>
                   <a:schemeClr val="tx1"/>
                 </a:solidFill>
@@ -10515,7 +10184,7 @@
               <a:t>Models</a:t>
             </a:r>
             <a:r>
-              <a:rPr lang="pt-BR" sz="2800" dirty="0" smtClean="0">
+              <a:rPr lang="pt-BR" sz="2800" dirty="0">
                 <a:solidFill>
                   <a:schemeClr val="tx1"/>
                 </a:solidFill>
@@ -10528,18 +10197,10 @@
                   <a:schemeClr val="tx1"/>
                 </a:solidFill>
               </a:rPr>
-              <a:t>V</a:t>
-            </a:r>
-            <a:r>
-              <a:rPr lang="pt-BR" sz="2800" dirty="0" err="1" smtClean="0">
-                <a:solidFill>
-                  <a:schemeClr val="tx1"/>
-                </a:solidFill>
-              </a:rPr>
-              <a:t>iews</a:t>
-            </a:r>
-            <a:r>
-              <a:rPr lang="pt-BR" sz="2800" dirty="0" smtClean="0">
+              <a:t>Views</a:t>
+            </a:r>
+            <a:r>
+              <a:rPr lang="pt-BR" sz="2800" dirty="0">
                 <a:solidFill>
                   <a:schemeClr val="tx1"/>
                 </a:solidFill>
@@ -10558,7 +10219,7 @@
               <a:buFont typeface="Wingdings" panose="05000000000000000000" pitchFamily="2" charset="2"/>
               <a:buChar char="Ø"/>
             </a:pPr>
-            <a:endParaRPr lang="pt-BR" sz="2800" dirty="0" smtClean="0">
+            <a:endParaRPr lang="pt-BR" sz="2800" dirty="0">
               <a:solidFill>
                 <a:schemeClr val="tx1"/>
               </a:solidFill>
@@ -10572,7 +10233,7 @@
               <a:buFont typeface="Wingdings" panose="05000000000000000000" pitchFamily="2" charset="2"/>
               <a:buChar char="Ø"/>
             </a:pPr>
-            <a:endParaRPr lang="pt-BR" sz="2400" dirty="0" smtClean="0">
+            <a:endParaRPr lang="pt-BR" sz="2400" dirty="0">
               <a:solidFill>
                 <a:schemeClr val="tx1"/>
               </a:solidFill>
@@ -10586,7 +10247,7 @@
               <a:buFont typeface="Wingdings" panose="05000000000000000000" pitchFamily="2" charset="2"/>
               <a:buChar char="Ø"/>
             </a:pPr>
-            <a:endParaRPr lang="pt-BR" sz="2400" dirty="0" smtClean="0">
+            <a:endParaRPr lang="pt-BR" sz="2400" dirty="0">
               <a:solidFill>
                 <a:schemeClr val="tx1"/>
               </a:solidFill>
@@ -10647,13 +10308,6 @@
   <p:clrMapOvr>
     <a:masterClrMapping/>
   </p:clrMapOvr>
-  <p:timing>
-    <p:tnLst>
-      <p:par>
-        <p:cTn id="1" dur="indefinite" restart="never" nodeType="tmRoot"/>
-      </p:par>
-    </p:tnLst>
-  </p:timing>
 </p:sld>
 </file>
 
@@ -10697,10 +10351,9 @@
           <a:lstStyle/>
           <a:p>
             <a:r>
-              <a:rPr lang="pt-BR" dirty="0" smtClean="0"/>
+              <a:rPr lang="pt-BR" dirty="0"/>
               <a:t>Implementação</a:t>
             </a:r>
-            <a:endParaRPr lang="pt-BR" dirty="0"/>
           </a:p>
         </p:txBody>
       </p:sp>
@@ -10838,7 +10491,7 @@
               <a:buChar char="Ø"/>
             </a:pPr>
             <a:r>
-              <a:rPr lang="pt-BR" sz="2800" dirty="0" smtClean="0">
+              <a:rPr lang="pt-BR" sz="2800" dirty="0">
                 <a:solidFill>
                   <a:schemeClr val="tx1"/>
                 </a:solidFill>
@@ -10858,7 +10511,7 @@
               <a:buChar char="Ø"/>
             </a:pPr>
             <a:r>
-              <a:rPr lang="pt-BR" sz="2800" dirty="0" smtClean="0">
+              <a:rPr lang="pt-BR" sz="2800" dirty="0">
                 <a:solidFill>
                   <a:schemeClr val="tx1"/>
                 </a:solidFill>
@@ -10878,7 +10531,7 @@
               <a:buChar char="Ø"/>
             </a:pPr>
             <a:r>
-              <a:rPr lang="pt-BR" sz="2800" dirty="0" smtClean="0">
+              <a:rPr lang="pt-BR" sz="2800" dirty="0">
                 <a:solidFill>
                   <a:schemeClr val="tx1"/>
                 </a:solidFill>
@@ -10898,7 +10551,7 @@
               <a:buChar char="Ø"/>
             </a:pPr>
             <a:r>
-              <a:rPr lang="pt-BR" sz="2800" dirty="0" smtClean="0">
+              <a:rPr lang="pt-BR" sz="2800" dirty="0">
                 <a:solidFill>
                   <a:schemeClr val="tx1"/>
                 </a:solidFill>
@@ -10918,7 +10571,7 @@
               <a:buChar char="Ø"/>
             </a:pPr>
             <a:r>
-              <a:rPr lang="pt-BR" sz="2800" dirty="0" smtClean="0">
+              <a:rPr lang="pt-BR" sz="2800" dirty="0">
                 <a:solidFill>
                   <a:schemeClr val="tx1"/>
                 </a:solidFill>
@@ -10936,7 +10589,7 @@
               </a:buClr>
             </a:pPr>
             <a:r>
-              <a:rPr lang="pt-BR" sz="2800" dirty="0" smtClean="0">
+              <a:rPr lang="pt-BR" sz="2800" dirty="0">
                 <a:solidFill>
                   <a:schemeClr val="tx1"/>
                 </a:solidFill>
@@ -10950,35 +10603,7 @@
                 <a:spcPct val="150000"/>
               </a:lnSpc>
             </a:pPr>
-            <a:endParaRPr lang="pt-BR" sz="2400" dirty="0" smtClean="0">
-              <a:solidFill>
-                <a:schemeClr val="tx1"/>
-              </a:solidFill>
-            </a:endParaRPr>
-          </a:p>
-          <a:p>
-            <a:pPr marL="342900" indent="-342900">
-              <a:lnSpc>
-                <a:spcPct val="150000"/>
-              </a:lnSpc>
-              <a:buFont typeface="Wingdings" panose="05000000000000000000" pitchFamily="2" charset="2"/>
-              <a:buChar char="Ø"/>
-            </a:pPr>
-            <a:endParaRPr lang="pt-BR" sz="2400" dirty="0" smtClean="0">
-              <a:solidFill>
-                <a:schemeClr val="tx1"/>
-              </a:solidFill>
-            </a:endParaRPr>
-          </a:p>
-          <a:p>
-            <a:pPr marL="342900" indent="-342900">
-              <a:lnSpc>
-                <a:spcPct val="150000"/>
-              </a:lnSpc>
-              <a:buFont typeface="Wingdings" panose="05000000000000000000" pitchFamily="2" charset="2"/>
-              <a:buChar char="Ø"/>
-            </a:pPr>
-            <a:endParaRPr lang="pt-BR" sz="2400" dirty="0" smtClean="0">
+            <a:endParaRPr lang="pt-BR" sz="2400" dirty="0">
               <a:solidFill>
                 <a:schemeClr val="tx1"/>
               </a:solidFill>
@@ -10998,6 +10623,34 @@
               </a:solidFill>
             </a:endParaRPr>
           </a:p>
+          <a:p>
+            <a:pPr marL="342900" indent="-342900">
+              <a:lnSpc>
+                <a:spcPct val="150000"/>
+              </a:lnSpc>
+              <a:buFont typeface="Wingdings" panose="05000000000000000000" pitchFamily="2" charset="2"/>
+              <a:buChar char="Ø"/>
+            </a:pPr>
+            <a:endParaRPr lang="pt-BR" sz="2400" dirty="0">
+              <a:solidFill>
+                <a:schemeClr val="tx1"/>
+              </a:solidFill>
+            </a:endParaRPr>
+          </a:p>
+          <a:p>
+            <a:pPr marL="342900" indent="-342900">
+              <a:lnSpc>
+                <a:spcPct val="150000"/>
+              </a:lnSpc>
+              <a:buFont typeface="Wingdings" panose="05000000000000000000" pitchFamily="2" charset="2"/>
+              <a:buChar char="Ø"/>
+            </a:pPr>
+            <a:endParaRPr lang="pt-BR" sz="2400" dirty="0">
+              <a:solidFill>
+                <a:schemeClr val="tx1"/>
+              </a:solidFill>
+            </a:endParaRPr>
+          </a:p>
         </p:txBody>
       </p:sp>
     </p:spTree>
@@ -11010,13 +10663,6 @@
   <p:clrMapOvr>
     <a:masterClrMapping/>
   </p:clrMapOvr>
-  <p:timing>
-    <p:tnLst>
-      <p:par>
-        <p:cTn id="1" dur="indefinite" restart="never" nodeType="tmRoot"/>
-      </p:par>
-    </p:tnLst>
-  </p:timing>
 </p:sld>
 </file>
 
@@ -11176,21 +10822,8 @@
                   <a:schemeClr val="tx1"/>
                 </a:solidFill>
               </a:rPr>
-              <a:t>Levantamento de requisitos</a:t>
-            </a:r>
-            <a:r>
-              <a:rPr lang="pt-BR" sz="2800" dirty="0" smtClean="0">
-                <a:solidFill>
-                  <a:schemeClr val="tx1"/>
-                </a:solidFill>
-              </a:rPr>
-              <a:t>;</a:t>
-            </a:r>
-            <a:endParaRPr lang="pt-BR" sz="2800" dirty="0" smtClean="0">
-              <a:solidFill>
-                <a:schemeClr val="tx1"/>
-              </a:solidFill>
-            </a:endParaRPr>
+              <a:t>Levantamento de requisitos;</a:t>
+            </a:r>
           </a:p>
           <a:p>
             <a:pPr marL="342900" indent="-342900">
@@ -11204,20 +10837,12 @@
               <a:buChar char="Ø"/>
             </a:pPr>
             <a:r>
-              <a:rPr lang="pt-BR" sz="2800" dirty="0" smtClean="0">
+              <a:rPr lang="pt-BR" sz="2800" dirty="0">
                 <a:solidFill>
                   <a:schemeClr val="tx1"/>
                 </a:solidFill>
               </a:rPr>
-              <a:t>Trabalho </a:t>
-            </a:r>
-            <a:r>
-              <a:rPr lang="pt-BR" sz="2800" dirty="0" smtClean="0">
-                <a:solidFill>
-                  <a:schemeClr val="tx1"/>
-                </a:solidFill>
-              </a:rPr>
-              <a:t>em equipe;</a:t>
+              <a:t>Trabalho em equipe;</a:t>
             </a:r>
           </a:p>
           <a:p>
@@ -11232,7 +10857,7 @@
               <a:buChar char="Ø"/>
             </a:pPr>
             <a:r>
-              <a:rPr lang="pt-BR" sz="2800" dirty="0" smtClean="0">
+              <a:rPr lang="pt-BR" sz="2800" dirty="0">
                 <a:solidFill>
                   <a:schemeClr val="tx1"/>
                 </a:solidFill>
@@ -11252,7 +10877,7 @@
               <a:buChar char="Ø"/>
             </a:pPr>
             <a:r>
-              <a:rPr lang="pt-BR" sz="2800" dirty="0" smtClean="0">
+              <a:rPr lang="pt-BR" sz="2800" dirty="0">
                 <a:solidFill>
                   <a:schemeClr val="tx1"/>
                 </a:solidFill>
@@ -11272,7 +10897,7 @@
               <a:buChar char="Ø"/>
             </a:pPr>
             <a:r>
-              <a:rPr lang="pt-BR" sz="2800" dirty="0" smtClean="0">
+              <a:rPr lang="pt-BR" sz="2800" dirty="0">
                 <a:solidFill>
                   <a:schemeClr val="tx1"/>
                 </a:solidFill>
@@ -11288,7 +10913,7 @@
               <a:buFont typeface="Wingdings" panose="05000000000000000000" pitchFamily="2" charset="2"/>
               <a:buChar char="Ø"/>
             </a:pPr>
-            <a:endParaRPr lang="pt-BR" sz="2400" dirty="0" smtClean="0">
+            <a:endParaRPr lang="pt-BR" sz="2400" dirty="0">
               <a:solidFill>
                 <a:schemeClr val="tx1"/>
               </a:solidFill>
@@ -11349,13 +10974,6 @@
   <p:clrMapOvr>
     <a:masterClrMapping/>
   </p:clrMapOvr>
-  <p:timing>
-    <p:tnLst>
-      <p:par>
-        <p:cTn id="1" dur="indefinite" restart="never" nodeType="tmRoot"/>
-      </p:par>
-    </p:tnLst>
-  </p:timing>
 </p:sld>
 </file>
 

</xml_diff>